<commit_message>
translation of instructions during experiment
translated all instructions, messages, and such that are presented during the experiment (i.e., after the initial general instructions about the task)
</commit_message>
<xml_diff>
--- a/instructions/AlienTask-fMRI_Instructions-German.pptx
+++ b/instructions/AlienTask-fMRI_Instructions-German.pptx
@@ -312,7 +312,7 @@
           <a:p>
             <a:fld id="{F130783D-20BB-4570-B65F-67ED88C16606}" type="datetimeFigureOut">
               <a:rPr lang="en-AU" smtClean="0"/>
-              <a:t>6/07/2022</a:t>
+              <a:t>21/07/2022</a:t>
             </a:fld>
             <a:endParaRPr lang="en-AU"/>
           </a:p>
@@ -482,7 +482,7 @@
           <a:p>
             <a:fld id="{F130783D-20BB-4570-B65F-67ED88C16606}" type="datetimeFigureOut">
               <a:rPr lang="en-AU" smtClean="0"/>
-              <a:t>6/07/2022</a:t>
+              <a:t>21/07/2022</a:t>
             </a:fld>
             <a:endParaRPr lang="en-AU"/>
           </a:p>
@@ -662,7 +662,7 @@
           <a:p>
             <a:fld id="{F130783D-20BB-4570-B65F-67ED88C16606}" type="datetimeFigureOut">
               <a:rPr lang="en-AU" smtClean="0"/>
-              <a:t>6/07/2022</a:t>
+              <a:t>21/07/2022</a:t>
             </a:fld>
             <a:endParaRPr lang="en-AU"/>
           </a:p>
@@ -832,7 +832,7 @@
           <a:p>
             <a:fld id="{F130783D-20BB-4570-B65F-67ED88C16606}" type="datetimeFigureOut">
               <a:rPr lang="en-AU" smtClean="0"/>
-              <a:t>6/07/2022</a:t>
+              <a:t>21/07/2022</a:t>
             </a:fld>
             <a:endParaRPr lang="en-AU"/>
           </a:p>
@@ -1078,7 +1078,7 @@
           <a:p>
             <a:fld id="{F130783D-20BB-4570-B65F-67ED88C16606}" type="datetimeFigureOut">
               <a:rPr lang="en-AU" smtClean="0"/>
-              <a:t>6/07/2022</a:t>
+              <a:t>21/07/2022</a:t>
             </a:fld>
             <a:endParaRPr lang="en-AU"/>
           </a:p>
@@ -1366,7 +1366,7 @@
           <a:p>
             <a:fld id="{F130783D-20BB-4570-B65F-67ED88C16606}" type="datetimeFigureOut">
               <a:rPr lang="en-AU" smtClean="0"/>
-              <a:t>6/07/2022</a:t>
+              <a:t>21/07/2022</a:t>
             </a:fld>
             <a:endParaRPr lang="en-AU"/>
           </a:p>
@@ -1788,7 +1788,7 @@
           <a:p>
             <a:fld id="{F130783D-20BB-4570-B65F-67ED88C16606}" type="datetimeFigureOut">
               <a:rPr lang="en-AU" smtClean="0"/>
-              <a:t>6/07/2022</a:t>
+              <a:t>21/07/2022</a:t>
             </a:fld>
             <a:endParaRPr lang="en-AU"/>
           </a:p>
@@ -1906,7 +1906,7 @@
           <a:p>
             <a:fld id="{F130783D-20BB-4570-B65F-67ED88C16606}" type="datetimeFigureOut">
               <a:rPr lang="en-AU" smtClean="0"/>
-              <a:t>6/07/2022</a:t>
+              <a:t>21/07/2022</a:t>
             </a:fld>
             <a:endParaRPr lang="en-AU"/>
           </a:p>
@@ -2001,7 +2001,7 @@
           <a:p>
             <a:fld id="{F130783D-20BB-4570-B65F-67ED88C16606}" type="datetimeFigureOut">
               <a:rPr lang="en-AU" smtClean="0"/>
-              <a:t>6/07/2022</a:t>
+              <a:t>21/07/2022</a:t>
             </a:fld>
             <a:endParaRPr lang="en-AU"/>
           </a:p>
@@ -2278,7 +2278,7 @@
           <a:p>
             <a:fld id="{F130783D-20BB-4570-B65F-67ED88C16606}" type="datetimeFigureOut">
               <a:rPr lang="en-AU" smtClean="0"/>
-              <a:t>6/07/2022</a:t>
+              <a:t>21/07/2022</a:t>
             </a:fld>
             <a:endParaRPr lang="en-AU"/>
           </a:p>
@@ -2531,7 +2531,7 @@
           <a:p>
             <a:fld id="{F130783D-20BB-4570-B65F-67ED88C16606}" type="datetimeFigureOut">
               <a:rPr lang="en-AU" smtClean="0"/>
-              <a:t>6/07/2022</a:t>
+              <a:t>21/07/2022</a:t>
             </a:fld>
             <a:endParaRPr lang="en-AU"/>
           </a:p>
@@ -2744,7 +2744,7 @@
           <a:p>
             <a:fld id="{F130783D-20BB-4570-B65F-67ED88C16606}" type="datetimeFigureOut">
               <a:rPr lang="en-AU" smtClean="0"/>
-              <a:t>6/07/2022</a:t>
+              <a:t>21/07/2022</a:t>
             </a:fld>
             <a:endParaRPr lang="en-AU"/>
           </a:p>
@@ -3487,7 +3487,7 @@
                 <a:latin typeface="Arial" panose="020B0604020202020204" pitchFamily="34" charset="0"/>
                 <a:cs typeface="Arial" panose="020B0604020202020204" pitchFamily="34" charset="0"/>
               </a:rPr>
-              <a:t>Sie werden lernen müssen, welcher Alien welchen Keks bevorzugt. Dies ist eine Aufgabe, bei der es auf Versuch und Irrtum ankommt. Nur wenn man aus seinen Fehlern lernt, kann man herausfinden, welchen Keks jedes Alien bevorzugt.</a:t>
+              <a:t>Sie werden lernen müssen, welches Alien welchen Keks bevorzugt. Dies ist eine Aufgabe, bei der es auf Versuch und Irrtum ankommt. Nur wenn man aus seinen Fehlern lernt, kann man herausfinden, welchen Keks jedes Alien bevorzugt.</a:t>
             </a:r>
           </a:p>
         </p:txBody>
@@ -3765,7 +3765,7 @@
                 <a:latin typeface="Arial" panose="020B0604020202020204" pitchFamily="34" charset="0"/>
                 <a:cs typeface="Arial" panose="020B0604020202020204" pitchFamily="34" charset="0"/>
               </a:rPr>
-              <a:t>Wenn Sie den Keks dem Alien auf der linken Seite des Bildschirms geben willst, drücken Sie die Taste &lt;Q&gt;. Wenn Sie ihn dem Alien auf der rechten Seite des Bildschirms geben wollen, drücken Sie die Taste &lt;P&gt;.</a:t>
+              <a:t>Wenn Sie den Keks dem Alien auf der linken Seite des Bildschirms geben wollen, drücken Sie die Taste &lt;Q&gt;. Wenn Sie ihn dem Alien auf der rechten Seite des Bildschirms geben wollen, drücken Sie die Taste &lt;P&gt;.</a:t>
             </a:r>
           </a:p>
           <a:p>

</xml_diff>

<commit_message>
modified instructions; included trial time out
modified instructions;
included a time out after 4s in each trial so that the stimuli would not be presented forever if there is no response;
changed the data save directory and filename;
included counterbalancing of stimuli & devaluation only in first session and loading this in subsequent sessions to keep it constant within participants;
changed to a newer random number generator
</commit_message>
<xml_diff>
--- a/instructions/AlienTask-fMRI_Instructions-German.pptx
+++ b/instructions/AlienTask-fMRI_Instructions-German.pptx
@@ -312,7 +312,7 @@
           <a:p>
             <a:fld id="{F130783D-20BB-4570-B65F-67ED88C16606}" type="datetimeFigureOut">
               <a:rPr lang="en-AU" smtClean="0"/>
-              <a:t>21/07/2022</a:t>
+              <a:t>29/07/2022</a:t>
             </a:fld>
             <a:endParaRPr lang="en-AU"/>
           </a:p>
@@ -482,7 +482,7 @@
           <a:p>
             <a:fld id="{F130783D-20BB-4570-B65F-67ED88C16606}" type="datetimeFigureOut">
               <a:rPr lang="en-AU" smtClean="0"/>
-              <a:t>21/07/2022</a:t>
+              <a:t>29/07/2022</a:t>
             </a:fld>
             <a:endParaRPr lang="en-AU"/>
           </a:p>
@@ -662,7 +662,7 @@
           <a:p>
             <a:fld id="{F130783D-20BB-4570-B65F-67ED88C16606}" type="datetimeFigureOut">
               <a:rPr lang="en-AU" smtClean="0"/>
-              <a:t>21/07/2022</a:t>
+              <a:t>29/07/2022</a:t>
             </a:fld>
             <a:endParaRPr lang="en-AU"/>
           </a:p>
@@ -832,7 +832,7 @@
           <a:p>
             <a:fld id="{F130783D-20BB-4570-B65F-67ED88C16606}" type="datetimeFigureOut">
               <a:rPr lang="en-AU" smtClean="0"/>
-              <a:t>21/07/2022</a:t>
+              <a:t>29/07/2022</a:t>
             </a:fld>
             <a:endParaRPr lang="en-AU"/>
           </a:p>
@@ -1078,7 +1078,7 @@
           <a:p>
             <a:fld id="{F130783D-20BB-4570-B65F-67ED88C16606}" type="datetimeFigureOut">
               <a:rPr lang="en-AU" smtClean="0"/>
-              <a:t>21/07/2022</a:t>
+              <a:t>29/07/2022</a:t>
             </a:fld>
             <a:endParaRPr lang="en-AU"/>
           </a:p>
@@ -1366,7 +1366,7 @@
           <a:p>
             <a:fld id="{F130783D-20BB-4570-B65F-67ED88C16606}" type="datetimeFigureOut">
               <a:rPr lang="en-AU" smtClean="0"/>
-              <a:t>21/07/2022</a:t>
+              <a:t>29/07/2022</a:t>
             </a:fld>
             <a:endParaRPr lang="en-AU"/>
           </a:p>
@@ -1788,7 +1788,7 @@
           <a:p>
             <a:fld id="{F130783D-20BB-4570-B65F-67ED88C16606}" type="datetimeFigureOut">
               <a:rPr lang="en-AU" smtClean="0"/>
-              <a:t>21/07/2022</a:t>
+              <a:t>29/07/2022</a:t>
             </a:fld>
             <a:endParaRPr lang="en-AU"/>
           </a:p>
@@ -1906,7 +1906,7 @@
           <a:p>
             <a:fld id="{F130783D-20BB-4570-B65F-67ED88C16606}" type="datetimeFigureOut">
               <a:rPr lang="en-AU" smtClean="0"/>
-              <a:t>21/07/2022</a:t>
+              <a:t>29/07/2022</a:t>
             </a:fld>
             <a:endParaRPr lang="en-AU"/>
           </a:p>
@@ -2001,7 +2001,7 @@
           <a:p>
             <a:fld id="{F130783D-20BB-4570-B65F-67ED88C16606}" type="datetimeFigureOut">
               <a:rPr lang="en-AU" smtClean="0"/>
-              <a:t>21/07/2022</a:t>
+              <a:t>29/07/2022</a:t>
             </a:fld>
             <a:endParaRPr lang="en-AU"/>
           </a:p>
@@ -2278,7 +2278,7 @@
           <a:p>
             <a:fld id="{F130783D-20BB-4570-B65F-67ED88C16606}" type="datetimeFigureOut">
               <a:rPr lang="en-AU" smtClean="0"/>
-              <a:t>21/07/2022</a:t>
+              <a:t>29/07/2022</a:t>
             </a:fld>
             <a:endParaRPr lang="en-AU"/>
           </a:p>
@@ -2531,7 +2531,7 @@
           <a:p>
             <a:fld id="{F130783D-20BB-4570-B65F-67ED88C16606}" type="datetimeFigureOut">
               <a:rPr lang="en-AU" smtClean="0"/>
-              <a:t>21/07/2022</a:t>
+              <a:t>29/07/2022</a:t>
             </a:fld>
             <a:endParaRPr lang="en-AU"/>
           </a:p>
@@ -2744,7 +2744,7 @@
           <a:p>
             <a:fld id="{F130783D-20BB-4570-B65F-67ED88C16606}" type="datetimeFigureOut">
               <a:rPr lang="en-AU" smtClean="0"/>
-              <a:t>21/07/2022</a:t>
+              <a:t>29/07/2022</a:t>
             </a:fld>
             <a:endParaRPr lang="en-AU"/>
           </a:p>
@@ -3375,8 +3375,8 @@
         </p:nvSpPr>
         <p:spPr>
           <a:xfrm>
-            <a:off x="6012160" y="6516052"/>
-            <a:ext cx="3283009" cy="369332"/>
+            <a:off x="5926552" y="6488668"/>
+            <a:ext cx="3240360" cy="369332"/>
           </a:xfrm>
           <a:prstGeom prst="rect">
             <a:avLst/>
@@ -3389,9 +3389,10 @@
           </a:bodyPr>
           <a:lstStyle/>
           <a:p>
+            <a:pPr algn="ctr"/>
             <a:r>
               <a:rPr lang="de-DE" i="1" dirty="0"/>
-              <a:t>Weiter mit Tastendruck…</a:t>
+              <a:t>Weiter mit der rechten Pfeiltaste</a:t>
             </a:r>
           </a:p>
         </p:txBody>
@@ -3635,41 +3636,6 @@
           </a:prstGeom>
         </p:spPr>
       </p:pic>
-      <p:sp>
-        <p:nvSpPr>
-          <p:cNvPr id="9" name="TextBox 9">
-            <a:extLst>
-              <a:ext uri="{FF2B5EF4-FFF2-40B4-BE49-F238E27FC236}">
-                <a16:creationId xmlns:a16="http://schemas.microsoft.com/office/drawing/2014/main" id="{6624F43A-EBF8-A347-9123-F81122BABCC7}"/>
-              </a:ext>
-            </a:extLst>
-          </p:cNvPr>
-          <p:cNvSpPr txBox="1"/>
-          <p:nvPr/>
-        </p:nvSpPr>
-        <p:spPr>
-          <a:xfrm>
-            <a:off x="6012161" y="6525344"/>
-            <a:ext cx="2952328" cy="369332"/>
-          </a:xfrm>
-          <a:prstGeom prst="rect">
-            <a:avLst/>
-          </a:prstGeom>
-          <a:noFill/>
-        </p:spPr>
-        <p:txBody>
-          <a:bodyPr wrap="square" rtlCol="0">
-            <a:spAutoFit/>
-          </a:bodyPr>
-          <a:lstStyle/>
-          <a:p>
-            <a:r>
-              <a:rPr lang="de-DE" i="1" dirty="0"/>
-              <a:t>Weiter mit Tastendruck…</a:t>
-            </a:r>
-          </a:p>
-        </p:txBody>
-      </p:sp>
       <p:pic>
         <p:nvPicPr>
           <p:cNvPr id="10" name="Picture 9">
@@ -3705,6 +3671,78 @@
           </a:prstGeom>
         </p:spPr>
       </p:pic>
+      <p:sp>
+        <p:nvSpPr>
+          <p:cNvPr id="12" name="TextBox 9">
+            <a:extLst>
+              <a:ext uri="{FF2B5EF4-FFF2-40B4-BE49-F238E27FC236}">
+                <a16:creationId xmlns:a16="http://schemas.microsoft.com/office/drawing/2014/main" id="{8401E6F8-F64B-4130-8BBD-BC93D871AB2E}"/>
+              </a:ext>
+            </a:extLst>
+          </p:cNvPr>
+          <p:cNvSpPr txBox="1"/>
+          <p:nvPr/>
+        </p:nvSpPr>
+        <p:spPr>
+          <a:xfrm>
+            <a:off x="5926552" y="6488668"/>
+            <a:ext cx="3240360" cy="369332"/>
+          </a:xfrm>
+          <a:prstGeom prst="rect">
+            <a:avLst/>
+          </a:prstGeom>
+          <a:noFill/>
+        </p:spPr>
+        <p:txBody>
+          <a:bodyPr wrap="square" rtlCol="0">
+            <a:spAutoFit/>
+          </a:bodyPr>
+          <a:lstStyle/>
+          <a:p>
+            <a:pPr algn="ctr"/>
+            <a:r>
+              <a:rPr lang="de-DE" i="1" dirty="0"/>
+              <a:t>Weiter mit der rechten Pfeiltaste</a:t>
+            </a:r>
+          </a:p>
+        </p:txBody>
+      </p:sp>
+      <p:sp>
+        <p:nvSpPr>
+          <p:cNvPr id="13" name="TextBox 9">
+            <a:extLst>
+              <a:ext uri="{FF2B5EF4-FFF2-40B4-BE49-F238E27FC236}">
+                <a16:creationId xmlns:a16="http://schemas.microsoft.com/office/drawing/2014/main" id="{D6CBCE58-17B0-4B16-B278-FCF1C6DE7A1C}"/>
+              </a:ext>
+            </a:extLst>
+          </p:cNvPr>
+          <p:cNvSpPr txBox="1"/>
+          <p:nvPr/>
+        </p:nvSpPr>
+        <p:spPr>
+          <a:xfrm>
+            <a:off x="2484" y="6488668"/>
+            <a:ext cx="3240360" cy="369332"/>
+          </a:xfrm>
+          <a:prstGeom prst="rect">
+            <a:avLst/>
+          </a:prstGeom>
+          <a:noFill/>
+        </p:spPr>
+        <p:txBody>
+          <a:bodyPr wrap="square" rtlCol="0">
+            <a:spAutoFit/>
+          </a:bodyPr>
+          <a:lstStyle/>
+          <a:p>
+            <a:pPr algn="ctr"/>
+            <a:r>
+              <a:rPr lang="de-DE" i="1" dirty="0"/>
+              <a:t>Zurück mit der linken Pfeiltaste</a:t>
+            </a:r>
+          </a:p>
+        </p:txBody>
+      </p:sp>
     </p:spTree>
     <p:extLst>
       <p:ext uri="{BB962C8B-B14F-4D97-AF65-F5344CB8AC3E}">
@@ -4060,10 +4098,10 @@
       </p:pic>
       <p:sp>
         <p:nvSpPr>
-          <p:cNvPr id="16" name="TextBox 9">
+          <p:cNvPr id="11" name="TextBox 9">
             <a:extLst>
               <a:ext uri="{FF2B5EF4-FFF2-40B4-BE49-F238E27FC236}">
-                <a16:creationId xmlns:a16="http://schemas.microsoft.com/office/drawing/2014/main" id="{92CA9A69-E210-436A-A3FA-92D4609ABAB8}"/>
+                <a16:creationId xmlns:a16="http://schemas.microsoft.com/office/drawing/2014/main" id="{295449FF-72B8-4470-A716-E04FB1E57A07}"/>
               </a:ext>
             </a:extLst>
           </p:cNvPr>
@@ -4072,8 +4110,8 @@
         </p:nvSpPr>
         <p:spPr>
           <a:xfrm>
-            <a:off x="6012161" y="6453336"/>
-            <a:ext cx="2952328" cy="369332"/>
+            <a:off x="5926552" y="6488668"/>
+            <a:ext cx="3240360" cy="369332"/>
           </a:xfrm>
           <a:prstGeom prst="rect">
             <a:avLst/>
@@ -4086,9 +4124,46 @@
           </a:bodyPr>
           <a:lstStyle/>
           <a:p>
+            <a:pPr algn="ctr"/>
             <a:r>
               <a:rPr lang="de-DE" i="1" dirty="0"/>
-              <a:t>Weiter mit Tastendruck…</a:t>
+              <a:t>Weiter mit der rechten Pfeiltaste</a:t>
+            </a:r>
+          </a:p>
+        </p:txBody>
+      </p:sp>
+      <p:sp>
+        <p:nvSpPr>
+          <p:cNvPr id="12" name="TextBox 9">
+            <a:extLst>
+              <a:ext uri="{FF2B5EF4-FFF2-40B4-BE49-F238E27FC236}">
+                <a16:creationId xmlns:a16="http://schemas.microsoft.com/office/drawing/2014/main" id="{2FFBE29E-BAA0-4363-9430-F954F5216766}"/>
+              </a:ext>
+            </a:extLst>
+          </p:cNvPr>
+          <p:cNvSpPr txBox="1"/>
+          <p:nvPr/>
+        </p:nvSpPr>
+        <p:spPr>
+          <a:xfrm>
+            <a:off x="2484" y="6488668"/>
+            <a:ext cx="3240360" cy="369332"/>
+          </a:xfrm>
+          <a:prstGeom prst="rect">
+            <a:avLst/>
+          </a:prstGeom>
+          <a:noFill/>
+        </p:spPr>
+        <p:txBody>
+          <a:bodyPr wrap="square" rtlCol="0">
+            <a:spAutoFit/>
+          </a:bodyPr>
+          <a:lstStyle/>
+          <a:p>
+            <a:pPr algn="ctr"/>
+            <a:r>
+              <a:rPr lang="de-DE" i="1" dirty="0"/>
+              <a:t>Zurück mit der linken Pfeiltaste</a:t>
             </a:r>
           </a:p>
         </p:txBody>
@@ -4369,10 +4444,10 @@
       </p:pic>
       <p:sp>
         <p:nvSpPr>
-          <p:cNvPr id="9" name="TextBox 9">
+          <p:cNvPr id="10" name="TextBox 9">
             <a:extLst>
               <a:ext uri="{FF2B5EF4-FFF2-40B4-BE49-F238E27FC236}">
-                <a16:creationId xmlns:a16="http://schemas.microsoft.com/office/drawing/2014/main" id="{055FEF22-40F5-4F09-8F41-82192F5FAAA5}"/>
+                <a16:creationId xmlns:a16="http://schemas.microsoft.com/office/drawing/2014/main" id="{08793946-3BAB-40EC-8D46-1D91E303A253}"/>
               </a:ext>
             </a:extLst>
           </p:cNvPr>
@@ -4381,8 +4456,8 @@
         </p:nvSpPr>
         <p:spPr>
           <a:xfrm>
-            <a:off x="6012161" y="6453336"/>
-            <a:ext cx="2952328" cy="369332"/>
+            <a:off x="5926552" y="6488668"/>
+            <a:ext cx="3240360" cy="369332"/>
           </a:xfrm>
           <a:prstGeom prst="rect">
             <a:avLst/>
@@ -4395,9 +4470,46 @@
           </a:bodyPr>
           <a:lstStyle/>
           <a:p>
+            <a:pPr algn="ctr"/>
             <a:r>
               <a:rPr lang="de-DE" i="1" dirty="0"/>
-              <a:t>Weiter mit Tastendruck…</a:t>
+              <a:t>Weiter mit der rechten Pfeiltaste</a:t>
+            </a:r>
+          </a:p>
+        </p:txBody>
+      </p:sp>
+      <p:sp>
+        <p:nvSpPr>
+          <p:cNvPr id="11" name="TextBox 9">
+            <a:extLst>
+              <a:ext uri="{FF2B5EF4-FFF2-40B4-BE49-F238E27FC236}">
+                <a16:creationId xmlns:a16="http://schemas.microsoft.com/office/drawing/2014/main" id="{92043C06-16E4-4767-A2EA-78E39DBD8115}"/>
+              </a:ext>
+            </a:extLst>
+          </p:cNvPr>
+          <p:cNvSpPr txBox="1"/>
+          <p:nvPr/>
+        </p:nvSpPr>
+        <p:spPr>
+          <a:xfrm>
+            <a:off x="2484" y="6488668"/>
+            <a:ext cx="3240360" cy="369332"/>
+          </a:xfrm>
+          <a:prstGeom prst="rect">
+            <a:avLst/>
+          </a:prstGeom>
+          <a:noFill/>
+        </p:spPr>
+        <p:txBody>
+          <a:bodyPr wrap="square" rtlCol="0">
+            <a:spAutoFit/>
+          </a:bodyPr>
+          <a:lstStyle/>
+          <a:p>
+            <a:pPr algn="ctr"/>
+            <a:r>
+              <a:rPr lang="de-DE" i="1" dirty="0"/>
+              <a:t>Zurück mit der linken Pfeiltaste</a:t>
             </a:r>
           </a:p>
         </p:txBody>
@@ -4876,10 +4988,10 @@
       </p:pic>
       <p:sp>
         <p:nvSpPr>
-          <p:cNvPr id="15" name="TextBox 9">
+          <p:cNvPr id="14" name="TextBox 9">
             <a:extLst>
               <a:ext uri="{FF2B5EF4-FFF2-40B4-BE49-F238E27FC236}">
-                <a16:creationId xmlns:a16="http://schemas.microsoft.com/office/drawing/2014/main" id="{966FF6D6-ACEA-4676-8659-A371F9D25729}"/>
+                <a16:creationId xmlns:a16="http://schemas.microsoft.com/office/drawing/2014/main" id="{B874BBAC-4EF3-4BB7-815A-120340B441C8}"/>
               </a:ext>
             </a:extLst>
           </p:cNvPr>
@@ -4888,8 +5000,8 @@
         </p:nvSpPr>
         <p:spPr>
           <a:xfrm>
-            <a:off x="6012161" y="6453336"/>
-            <a:ext cx="2952328" cy="369332"/>
+            <a:off x="5926552" y="6488668"/>
+            <a:ext cx="3240360" cy="369332"/>
           </a:xfrm>
           <a:prstGeom prst="rect">
             <a:avLst/>
@@ -4902,9 +5014,46 @@
           </a:bodyPr>
           <a:lstStyle/>
           <a:p>
+            <a:pPr algn="ctr"/>
             <a:r>
               <a:rPr lang="de-DE" i="1" dirty="0"/>
-              <a:t>Weiter mit Tastendruck…</a:t>
+              <a:t>Weiter mit der rechten Pfeiltaste</a:t>
+            </a:r>
+          </a:p>
+        </p:txBody>
+      </p:sp>
+      <p:sp>
+        <p:nvSpPr>
+          <p:cNvPr id="16" name="TextBox 9">
+            <a:extLst>
+              <a:ext uri="{FF2B5EF4-FFF2-40B4-BE49-F238E27FC236}">
+                <a16:creationId xmlns:a16="http://schemas.microsoft.com/office/drawing/2014/main" id="{38AED9EA-CB95-4652-832D-F244F83DFBFC}"/>
+              </a:ext>
+            </a:extLst>
+          </p:cNvPr>
+          <p:cNvSpPr txBox="1"/>
+          <p:nvPr/>
+        </p:nvSpPr>
+        <p:spPr>
+          <a:xfrm>
+            <a:off x="2484" y="6488668"/>
+            <a:ext cx="3240360" cy="369332"/>
+          </a:xfrm>
+          <a:prstGeom prst="rect">
+            <a:avLst/>
+          </a:prstGeom>
+          <a:noFill/>
+        </p:spPr>
+        <p:txBody>
+          <a:bodyPr wrap="square" rtlCol="0">
+            <a:spAutoFit/>
+          </a:bodyPr>
+          <a:lstStyle/>
+          <a:p>
+            <a:pPr algn="ctr"/>
+            <a:r>
+              <a:rPr lang="de-DE" i="1" dirty="0"/>
+              <a:t>Zurück mit der linken Pfeiltaste</a:t>
             </a:r>
           </a:p>
         </p:txBody>
@@ -4961,8 +5110,8 @@
         </p:blipFill>
         <p:spPr>
           <a:xfrm>
-            <a:off x="10116" y="-278"/>
-            <a:ext cx="9123769" cy="6669361"/>
+            <a:off x="10116" y="-277"/>
+            <a:ext cx="9123769" cy="6488946"/>
           </a:xfrm>
           <a:prstGeom prst="rect">
             <a:avLst/>
@@ -5053,10 +5202,10 @@
       </p:sp>
       <p:sp>
         <p:nvSpPr>
-          <p:cNvPr id="5" name="TextBox 9">
+          <p:cNvPr id="6" name="TextBox 9">
             <a:extLst>
               <a:ext uri="{FF2B5EF4-FFF2-40B4-BE49-F238E27FC236}">
-                <a16:creationId xmlns:a16="http://schemas.microsoft.com/office/drawing/2014/main" id="{669B9086-412A-4FDA-9B9F-36F4FB4E5D7C}"/>
+                <a16:creationId xmlns:a16="http://schemas.microsoft.com/office/drawing/2014/main" id="{98FA08AC-3700-40F8-903B-AA44D6D5E45D}"/>
               </a:ext>
             </a:extLst>
           </p:cNvPr>
@@ -5065,8 +5214,8 @@
         </p:nvSpPr>
         <p:spPr>
           <a:xfrm>
-            <a:off x="6300192" y="6372036"/>
-            <a:ext cx="2952328" cy="369332"/>
+            <a:off x="5926552" y="6488668"/>
+            <a:ext cx="3240360" cy="369332"/>
           </a:xfrm>
           <a:prstGeom prst="rect">
             <a:avLst/>
@@ -5079,9 +5228,46 @@
           </a:bodyPr>
           <a:lstStyle/>
           <a:p>
+            <a:pPr algn="ctr"/>
             <a:r>
               <a:rPr lang="de-DE" i="1" dirty="0"/>
-              <a:t>Weiter mit Tastendruck…</a:t>
+              <a:t>Weiter mit der rechten Pfeiltaste</a:t>
+            </a:r>
+          </a:p>
+        </p:txBody>
+      </p:sp>
+      <p:sp>
+        <p:nvSpPr>
+          <p:cNvPr id="7" name="TextBox 9">
+            <a:extLst>
+              <a:ext uri="{FF2B5EF4-FFF2-40B4-BE49-F238E27FC236}">
+                <a16:creationId xmlns:a16="http://schemas.microsoft.com/office/drawing/2014/main" id="{B943DF00-C06E-4C4B-B5DE-AA62C9F61DA1}"/>
+              </a:ext>
+            </a:extLst>
+          </p:cNvPr>
+          <p:cNvSpPr txBox="1"/>
+          <p:nvPr/>
+        </p:nvSpPr>
+        <p:spPr>
+          <a:xfrm>
+            <a:off x="2484" y="6488668"/>
+            <a:ext cx="3240360" cy="369332"/>
+          </a:xfrm>
+          <a:prstGeom prst="rect">
+            <a:avLst/>
+          </a:prstGeom>
+          <a:noFill/>
+        </p:spPr>
+        <p:txBody>
+          <a:bodyPr wrap="square" rtlCol="0">
+            <a:spAutoFit/>
+          </a:bodyPr>
+          <a:lstStyle/>
+          <a:p>
+            <a:pPr algn="ctr"/>
+            <a:r>
+              <a:rPr lang="de-DE" i="1" dirty="0"/>
+              <a:t>Zurück mit der linken Pfeiltaste</a:t>
             </a:r>
           </a:p>
         </p:txBody>
@@ -5138,8 +5324,8 @@
         </p:blipFill>
         <p:spPr>
           <a:xfrm>
-            <a:off x="10116" y="-278"/>
-            <a:ext cx="9123769" cy="6669361"/>
+            <a:off x="10116" y="-277"/>
+            <a:ext cx="9123769" cy="6488945"/>
           </a:xfrm>
           <a:prstGeom prst="rect">
             <a:avLst/>
@@ -5229,10 +5415,10 @@
       </p:sp>
       <p:sp>
         <p:nvSpPr>
-          <p:cNvPr id="6" name="TextBox 9">
+          <p:cNvPr id="5" name="TextBox 9">
             <a:extLst>
               <a:ext uri="{FF2B5EF4-FFF2-40B4-BE49-F238E27FC236}">
-                <a16:creationId xmlns:a16="http://schemas.microsoft.com/office/drawing/2014/main" id="{6ABCF256-9AF2-446C-8E78-3D57D70FB5A9}"/>
+                <a16:creationId xmlns:a16="http://schemas.microsoft.com/office/drawing/2014/main" id="{18A2EC95-91F6-4E6B-9F89-6C7FB2EB2950}"/>
               </a:ext>
             </a:extLst>
           </p:cNvPr>
@@ -5241,8 +5427,8 @@
         </p:nvSpPr>
         <p:spPr>
           <a:xfrm>
-            <a:off x="6300192" y="6372036"/>
-            <a:ext cx="2952328" cy="369332"/>
+            <a:off x="5926552" y="6488668"/>
+            <a:ext cx="3240360" cy="369332"/>
           </a:xfrm>
           <a:prstGeom prst="rect">
             <a:avLst/>
@@ -5255,9 +5441,46 @@
           </a:bodyPr>
           <a:lstStyle/>
           <a:p>
+            <a:pPr algn="ctr"/>
             <a:r>
               <a:rPr lang="de-DE" i="1" dirty="0"/>
-              <a:t>Weiter mit Tastendruck…</a:t>
+              <a:t>Weiter mit der rechten Pfeiltaste</a:t>
+            </a:r>
+          </a:p>
+        </p:txBody>
+      </p:sp>
+      <p:sp>
+        <p:nvSpPr>
+          <p:cNvPr id="7" name="TextBox 9">
+            <a:extLst>
+              <a:ext uri="{FF2B5EF4-FFF2-40B4-BE49-F238E27FC236}">
+                <a16:creationId xmlns:a16="http://schemas.microsoft.com/office/drawing/2014/main" id="{1809A5C1-D2EA-44A0-8E17-783C0FC20BDD}"/>
+              </a:ext>
+            </a:extLst>
+          </p:cNvPr>
+          <p:cNvSpPr txBox="1"/>
+          <p:nvPr/>
+        </p:nvSpPr>
+        <p:spPr>
+          <a:xfrm>
+            <a:off x="2484" y="6488668"/>
+            <a:ext cx="3240360" cy="369332"/>
+          </a:xfrm>
+          <a:prstGeom prst="rect">
+            <a:avLst/>
+          </a:prstGeom>
+          <a:noFill/>
+        </p:spPr>
+        <p:txBody>
+          <a:bodyPr wrap="square" rtlCol="0">
+            <a:spAutoFit/>
+          </a:bodyPr>
+          <a:lstStyle/>
+          <a:p>
+            <a:pPr algn="ctr"/>
+            <a:r>
+              <a:rPr lang="de-DE" i="1" dirty="0"/>
+              <a:t>Zurück mit der linken Pfeiltaste</a:t>
             </a:r>
           </a:p>
         </p:txBody>
@@ -5314,8 +5537,8 @@
         </p:blipFill>
         <p:spPr>
           <a:xfrm>
-            <a:off x="10116" y="-278"/>
-            <a:ext cx="9123769" cy="6669361"/>
+            <a:off x="10116" y="-277"/>
+            <a:ext cx="9123769" cy="6488946"/>
           </a:xfrm>
           <a:prstGeom prst="rect">
             <a:avLst/>
@@ -5398,10 +5621,10 @@
       </p:sp>
       <p:sp>
         <p:nvSpPr>
-          <p:cNvPr id="6" name="TextBox 9">
+          <p:cNvPr id="5" name="TextBox 9">
             <a:extLst>
               <a:ext uri="{FF2B5EF4-FFF2-40B4-BE49-F238E27FC236}">
-                <a16:creationId xmlns:a16="http://schemas.microsoft.com/office/drawing/2014/main" id="{6ABCF256-9AF2-446C-8E78-3D57D70FB5A9}"/>
+                <a16:creationId xmlns:a16="http://schemas.microsoft.com/office/drawing/2014/main" id="{C1F752A1-58EF-4336-9301-622D5D9DE51C}"/>
               </a:ext>
             </a:extLst>
           </p:cNvPr>
@@ -5410,8 +5633,8 @@
         </p:nvSpPr>
         <p:spPr>
           <a:xfrm>
-            <a:off x="6300192" y="6372036"/>
-            <a:ext cx="2952328" cy="369332"/>
+            <a:off x="5926552" y="6488668"/>
+            <a:ext cx="3240360" cy="369332"/>
           </a:xfrm>
           <a:prstGeom prst="rect">
             <a:avLst/>
@@ -5424,9 +5647,46 @@
           </a:bodyPr>
           <a:lstStyle/>
           <a:p>
+            <a:pPr algn="ctr"/>
             <a:r>
               <a:rPr lang="de-DE" i="1" dirty="0"/>
-              <a:t>Weiter mit Tastendruck…</a:t>
+              <a:t>Weiter mit der rechten Pfeiltaste</a:t>
+            </a:r>
+          </a:p>
+        </p:txBody>
+      </p:sp>
+      <p:sp>
+        <p:nvSpPr>
+          <p:cNvPr id="7" name="TextBox 9">
+            <a:extLst>
+              <a:ext uri="{FF2B5EF4-FFF2-40B4-BE49-F238E27FC236}">
+                <a16:creationId xmlns:a16="http://schemas.microsoft.com/office/drawing/2014/main" id="{D6B3296D-73A6-485F-B350-95453D62EB8F}"/>
+              </a:ext>
+            </a:extLst>
+          </p:cNvPr>
+          <p:cNvSpPr txBox="1"/>
+          <p:nvPr/>
+        </p:nvSpPr>
+        <p:spPr>
+          <a:xfrm>
+            <a:off x="2484" y="6488668"/>
+            <a:ext cx="3240360" cy="369332"/>
+          </a:xfrm>
+          <a:prstGeom prst="rect">
+            <a:avLst/>
+          </a:prstGeom>
+          <a:noFill/>
+        </p:spPr>
+        <p:txBody>
+          <a:bodyPr wrap="square" rtlCol="0">
+            <a:spAutoFit/>
+          </a:bodyPr>
+          <a:lstStyle/>
+          <a:p>
+            <a:pPr algn="ctr"/>
+            <a:r>
+              <a:rPr lang="de-DE" i="1" dirty="0"/>
+              <a:t>Zurück mit der linken Pfeiltaste</a:t>
             </a:r>
           </a:p>
         </p:txBody>
@@ -5613,6 +5873,42 @@
           </a:prstGeom>
         </p:spPr>
       </p:pic>
+      <p:sp>
+        <p:nvSpPr>
+          <p:cNvPr id="6" name="TextBox 9">
+            <a:extLst>
+              <a:ext uri="{FF2B5EF4-FFF2-40B4-BE49-F238E27FC236}">
+                <a16:creationId xmlns:a16="http://schemas.microsoft.com/office/drawing/2014/main" id="{EB275ECB-A806-4F23-AD08-4A9209C7FFE6}"/>
+              </a:ext>
+            </a:extLst>
+          </p:cNvPr>
+          <p:cNvSpPr txBox="1"/>
+          <p:nvPr/>
+        </p:nvSpPr>
+        <p:spPr>
+          <a:xfrm>
+            <a:off x="2484" y="6488668"/>
+            <a:ext cx="3240360" cy="369332"/>
+          </a:xfrm>
+          <a:prstGeom prst="rect">
+            <a:avLst/>
+          </a:prstGeom>
+          <a:noFill/>
+        </p:spPr>
+        <p:txBody>
+          <a:bodyPr wrap="square" rtlCol="0">
+            <a:spAutoFit/>
+          </a:bodyPr>
+          <a:lstStyle/>
+          <a:p>
+            <a:pPr algn="ctr"/>
+            <a:r>
+              <a:rPr lang="de-DE" i="1" dirty="0"/>
+              <a:t>Zurück mit der linken Pfeiltaste</a:t>
+            </a:r>
+          </a:p>
+        </p:txBody>
+      </p:sp>
     </p:spTree>
     <p:extLst>
       <p:ext uri="{BB962C8B-B14F-4D97-AF65-F5344CB8AC3E}">

</xml_diff>

<commit_message>
final task version for pilot
adapted task to run on session 2-5;
adapted instructions incl. payout scheme;
fit instructions to wide screen
</commit_message>
<xml_diff>
--- a/instructions/AlienTask-fMRI_Instructions-German.pptx
+++ b/instructions/AlienTask-fMRI_Instructions-German.pptx
@@ -312,7 +312,7 @@
           <a:p>
             <a:fld id="{F130783D-20BB-4570-B65F-67ED88C16606}" type="datetimeFigureOut">
               <a:rPr lang="en-AU" smtClean="0"/>
-              <a:t>29/07/2022</a:t>
+              <a:t>29/08/2022</a:t>
             </a:fld>
             <a:endParaRPr lang="en-AU"/>
           </a:p>
@@ -482,7 +482,7 @@
           <a:p>
             <a:fld id="{F130783D-20BB-4570-B65F-67ED88C16606}" type="datetimeFigureOut">
               <a:rPr lang="en-AU" smtClean="0"/>
-              <a:t>29/07/2022</a:t>
+              <a:t>29/08/2022</a:t>
             </a:fld>
             <a:endParaRPr lang="en-AU"/>
           </a:p>
@@ -662,7 +662,7 @@
           <a:p>
             <a:fld id="{F130783D-20BB-4570-B65F-67ED88C16606}" type="datetimeFigureOut">
               <a:rPr lang="en-AU" smtClean="0"/>
-              <a:t>29/07/2022</a:t>
+              <a:t>29/08/2022</a:t>
             </a:fld>
             <a:endParaRPr lang="en-AU"/>
           </a:p>
@@ -832,7 +832,7 @@
           <a:p>
             <a:fld id="{F130783D-20BB-4570-B65F-67ED88C16606}" type="datetimeFigureOut">
               <a:rPr lang="en-AU" smtClean="0"/>
-              <a:t>29/07/2022</a:t>
+              <a:t>29/08/2022</a:t>
             </a:fld>
             <a:endParaRPr lang="en-AU"/>
           </a:p>
@@ -1078,7 +1078,7 @@
           <a:p>
             <a:fld id="{F130783D-20BB-4570-B65F-67ED88C16606}" type="datetimeFigureOut">
               <a:rPr lang="en-AU" smtClean="0"/>
-              <a:t>29/07/2022</a:t>
+              <a:t>29/08/2022</a:t>
             </a:fld>
             <a:endParaRPr lang="en-AU"/>
           </a:p>
@@ -1366,7 +1366,7 @@
           <a:p>
             <a:fld id="{F130783D-20BB-4570-B65F-67ED88C16606}" type="datetimeFigureOut">
               <a:rPr lang="en-AU" smtClean="0"/>
-              <a:t>29/07/2022</a:t>
+              <a:t>29/08/2022</a:t>
             </a:fld>
             <a:endParaRPr lang="en-AU"/>
           </a:p>
@@ -1788,7 +1788,7 @@
           <a:p>
             <a:fld id="{F130783D-20BB-4570-B65F-67ED88C16606}" type="datetimeFigureOut">
               <a:rPr lang="en-AU" smtClean="0"/>
-              <a:t>29/07/2022</a:t>
+              <a:t>29/08/2022</a:t>
             </a:fld>
             <a:endParaRPr lang="en-AU"/>
           </a:p>
@@ -1906,7 +1906,7 @@
           <a:p>
             <a:fld id="{F130783D-20BB-4570-B65F-67ED88C16606}" type="datetimeFigureOut">
               <a:rPr lang="en-AU" smtClean="0"/>
-              <a:t>29/07/2022</a:t>
+              <a:t>29/08/2022</a:t>
             </a:fld>
             <a:endParaRPr lang="en-AU"/>
           </a:p>
@@ -2001,7 +2001,7 @@
           <a:p>
             <a:fld id="{F130783D-20BB-4570-B65F-67ED88C16606}" type="datetimeFigureOut">
               <a:rPr lang="en-AU" smtClean="0"/>
-              <a:t>29/07/2022</a:t>
+              <a:t>29/08/2022</a:t>
             </a:fld>
             <a:endParaRPr lang="en-AU"/>
           </a:p>
@@ -2278,7 +2278,7 @@
           <a:p>
             <a:fld id="{F130783D-20BB-4570-B65F-67ED88C16606}" type="datetimeFigureOut">
               <a:rPr lang="en-AU" smtClean="0"/>
-              <a:t>29/07/2022</a:t>
+              <a:t>29/08/2022</a:t>
             </a:fld>
             <a:endParaRPr lang="en-AU"/>
           </a:p>
@@ -2531,7 +2531,7 @@
           <a:p>
             <a:fld id="{F130783D-20BB-4570-B65F-67ED88C16606}" type="datetimeFigureOut">
               <a:rPr lang="en-AU" smtClean="0"/>
-              <a:t>29/07/2022</a:t>
+              <a:t>29/08/2022</a:t>
             </a:fld>
             <a:endParaRPr lang="en-AU"/>
           </a:p>
@@ -2744,7 +2744,7 @@
           <a:p>
             <a:fld id="{F130783D-20BB-4570-B65F-67ED88C16606}" type="datetimeFigureOut">
               <a:rPr lang="en-AU" smtClean="0"/>
-              <a:t>29/07/2022</a:t>
+              <a:t>29/08/2022</a:t>
             </a:fld>
             <a:endParaRPr lang="en-AU"/>
           </a:p>
@@ -4216,7 +4216,7 @@
         </p:spPr>
         <p:txBody>
           <a:bodyPr>
-            <a:normAutofit/>
+            <a:normAutofit lnSpcReduction="10000"/>
           </a:bodyPr>
           <a:lstStyle/>
           <a:p>
@@ -4261,7 +4261,7 @@
                 <a:latin typeface="Arial" panose="020B0604020202020204" pitchFamily="34" charset="0"/>
                 <a:cs typeface="Arial" panose="020B0604020202020204" pitchFamily="34" charset="0"/>
               </a:rPr>
-              <a:t>Die 6 besten Ergebnisse werden mit 25 Euro belohnt!</a:t>
+              <a:t>Am Ende werden drei Entscheidungen zufällig ausgewählt und die gewonnenen Punkte in dieser Entscheidung in Rappen ausgezahlt.</a:t>
             </a:r>
           </a:p>
         </p:txBody>
@@ -5345,7 +5345,7 @@
         <p:spPr>
           <a:xfrm>
             <a:off x="611560" y="1412776"/>
-            <a:ext cx="7920880" cy="3672408"/>
+            <a:ext cx="7920880" cy="3384376"/>
           </a:xfrm>
           <a:solidFill>
             <a:schemeClr val="bg1">
@@ -5388,7 +5388,7 @@
                 <a:latin typeface="Arial" panose="020B0604020202020204" pitchFamily="34" charset="0"/>
                 <a:cs typeface="Arial" panose="020B0604020202020204" pitchFamily="34" charset="0"/>
               </a:rPr>
-              <a:t>In diesen Fällen steht das Zeichen '??' hinter der Raute und nicht hinter ihrem Wert. Keine Sorge, der Wert des Diamanten </a:t>
+              <a:t>In diesen Fällen sehen Sie '??’ statt des Wertes. Keine Sorge, der Wert des Diamanten </a:t>
             </a:r>
             <a:r>
               <a:rPr lang="de-CH" sz="2400" b="1" dirty="0">
@@ -5602,7 +5602,7 @@
                 <a:latin typeface="Arial" panose="020B0604020202020204" pitchFamily="34" charset="0"/>
                 <a:cs typeface="Arial" panose="020B0604020202020204" pitchFamily="34" charset="0"/>
               </a:rPr>
-              <a:t>Es ist wichtig, sich dies zu merken, um die Punktzahl zu maximieren, indem man vermeidet, DIAMONEN zu erhalten, die 0 PUNKTE wert sind. </a:t>
+              <a:t>Es ist wichtig, sich dies zu merken, um die Punktzahl zu maximieren, indem man vermeidet, DIAMANTEN zu erhalten, die 0 PUNKTE wert sind. </a:t>
             </a:r>
           </a:p>
           <a:p>

</xml_diff>